<commit_message>
Add the annotation study into pptx
</commit_message>
<xml_diff>
--- a/JavaStudy/JavaStudyNote/Annotation/Java_Annotation.pptx
+++ b/JavaStudy/JavaStudyNote/Annotation/Java_Annotation.pptx
@@ -8,6 +8,7 @@
     <p:sldId id="256" r:id="rId2"/>
     <p:sldId id="257" r:id="rId3"/>
     <p:sldId id="258" r:id="rId4"/>
+    <p:sldId id="259" r:id="rId5"/>
   </p:sldIdLst>
   <p:sldSz cx="12192000" cy="6858000"/>
   <p:notesSz cx="6858000" cy="9144000"/>
@@ -106,6 +107,11 @@
       </a:defRPr>
     </a:lvl9pPr>
   </p:defaultTextStyle>
+  <p:extLst>
+    <p:ext uri="{EFAFB233-063F-42B5-8137-9DF3F51BA10A}">
+      <p15:sldGuideLst xmlns:p15="http://schemas.microsoft.com/office/powerpoint/2012/main"/>
+    </p:ext>
+  </p:extLst>
 </p:presentation>
 </file>
 
@@ -3557,7 +3563,7 @@
         <p:spPr>
           <a:xfrm>
             <a:off x="314960" y="203200"/>
-            <a:ext cx="11480800" cy="2031325"/>
+            <a:ext cx="11480800" cy="4247317"/>
           </a:xfrm>
           <a:prstGeom prst="rect">
             <a:avLst/>
@@ -3668,7 +3674,210 @@
             </a:r>
             <a:r>
               <a:rPr lang="zh-CN" altLang="en-US" dirty="0"/>
-              <a:t>编译器将会给出警告。</a:t>
+              <a:t>编译器将会给出警告</a:t>
+            </a:r>
+            <a:r>
+              <a:rPr lang="zh-CN" altLang="en-US" dirty="0" smtClean="0"/>
+              <a:t>。</a:t>
+            </a:r>
+            <a:endParaRPr lang="en-US" altLang="zh-CN" dirty="0" smtClean="0"/>
+          </a:p>
+          <a:p>
+            <a:r>
+              <a:rPr lang="en-US" altLang="zh-TW" dirty="0"/>
+              <a:t>		 @Deprecated(since = </a:t>
+            </a:r>
+            <a:r>
+              <a:rPr lang="en-US" altLang="zh-TW" dirty="0" smtClean="0"/>
+              <a:t>“3”, </a:t>
+            </a:r>
+            <a:r>
+              <a:rPr lang="en-US" altLang="zh-TW" dirty="0" err="1"/>
+              <a:t>forRemoval</a:t>
+            </a:r>
+            <a:r>
+              <a:rPr lang="en-US" altLang="zh-TW" dirty="0"/>
+              <a:t> = true</a:t>
+            </a:r>
+            <a:r>
+              <a:rPr lang="en-US" altLang="zh-TW" dirty="0" smtClean="0"/>
+              <a:t>)   </a:t>
+            </a:r>
+            <a:r>
+              <a:rPr lang="en-US" altLang="zh-CN" dirty="0" smtClean="0"/>
+              <a:t>since</a:t>
+            </a:r>
+            <a:r>
+              <a:rPr lang="zh-CN" altLang="en-US" dirty="0" smtClean="0"/>
+              <a:t>代表从哪个</a:t>
+            </a:r>
+            <a:r>
+              <a:rPr lang="en-US" altLang="zh-CN" dirty="0" err="1" smtClean="0"/>
+              <a:t>jdk</a:t>
+            </a:r>
+            <a:r>
+              <a:rPr lang="zh-CN" altLang="en-US" dirty="0" smtClean="0"/>
+              <a:t>开始 </a:t>
+            </a:r>
+            <a:r>
+              <a:rPr lang="en-US" altLang="zh-TW" dirty="0" err="1" smtClean="0"/>
+              <a:t>forRemoval</a:t>
+            </a:r>
+            <a:r>
+              <a:rPr lang="zh-CN" altLang="en-US" dirty="0" smtClean="0"/>
+              <a:t>代表是否会被移</a:t>
+            </a:r>
+            <a:endParaRPr lang="en-US" altLang="zh-CN" dirty="0" smtClean="0"/>
+          </a:p>
+          <a:p>
+            <a:r>
+              <a:rPr lang="en-US" altLang="zh-CN" dirty="0" smtClean="0"/>
+              <a:t>                                     </a:t>
+            </a:r>
+            <a:r>
+              <a:rPr lang="zh-CN" altLang="en-US" dirty="0" smtClean="0"/>
+              <a:t>除未来</a:t>
+            </a:r>
+            <a:endParaRPr lang="en-US" altLang="zh-CN" dirty="0" smtClean="0"/>
+          </a:p>
+          <a:p>
+            <a:endParaRPr lang="en-US" altLang="zh-TW" dirty="0"/>
+          </a:p>
+          <a:p>
+            <a:r>
+              <a:rPr lang="en-US" altLang="zh-TW" dirty="0" smtClean="0"/>
+              <a:t>	3.</a:t>
+            </a:r>
+            <a:r>
+              <a:rPr lang="en-US" altLang="zh-CN" dirty="0"/>
+              <a:t> @</a:t>
+            </a:r>
+            <a:r>
+              <a:rPr lang="en-US" altLang="zh-CN" dirty="0" err="1"/>
+              <a:t>SuppressWarnings</a:t>
+            </a:r>
+            <a:r>
+              <a:rPr lang="zh-CN" altLang="en-US" dirty="0"/>
+              <a:t>指示被该注解修饰的程序元素（以及该程序</a:t>
+            </a:r>
+            <a:r>
+              <a:rPr lang="zh-CN" altLang="en-US" dirty="0" smtClean="0"/>
+              <a:t>元素</a:t>
+            </a:r>
+            <a:r>
+              <a:rPr lang="zh-CN" altLang="en-US" dirty="0"/>
+              <a:t>中的所有子元素）取消显示指定</a:t>
+            </a:r>
+            <a:r>
+              <a:rPr lang="zh-CN" altLang="en-US" dirty="0" smtClean="0"/>
+              <a:t>的</a:t>
+            </a:r>
+            <a:endParaRPr lang="en-US" altLang="zh-CN" dirty="0" smtClean="0"/>
+          </a:p>
+          <a:p>
+            <a:r>
+              <a:rPr lang="en-US" altLang="zh-CN" dirty="0" smtClean="0"/>
+              <a:t>                     </a:t>
+            </a:r>
+            <a:r>
+              <a:rPr lang="zh-CN" altLang="en-US" dirty="0" smtClean="0"/>
+              <a:t>编译器</a:t>
+            </a:r>
+            <a:r>
+              <a:rPr lang="zh-CN" altLang="en-US" dirty="0"/>
+              <a:t>警告。</a:t>
+            </a:r>
+            <a:r>
+              <a:rPr lang="en-US" altLang="zh-CN" dirty="0"/>
+              <a:t>@</a:t>
+            </a:r>
+            <a:r>
+              <a:rPr lang="en-US" altLang="zh-CN" dirty="0" err="1" smtClean="0"/>
+              <a:t>SuppressWarnings</a:t>
+            </a:r>
+            <a:r>
+              <a:rPr lang="zh-CN" altLang="en-US" dirty="0" smtClean="0"/>
+              <a:t>会</a:t>
+            </a:r>
+            <a:r>
+              <a:rPr lang="zh-CN" altLang="en-US" dirty="0"/>
+              <a:t>一直作用于该程序元素的所有子元素， 例如， </a:t>
+            </a:r>
+            <a:r>
+              <a:rPr lang="zh-CN" altLang="en-US" dirty="0" smtClean="0"/>
+              <a:t>使用</a:t>
+            </a:r>
+          </a:p>
+          <a:p>
+            <a:r>
+              <a:rPr lang="en-US" altLang="zh-CN" dirty="0"/>
+              <a:t> </a:t>
+            </a:r>
+            <a:r>
+              <a:rPr lang="en-US" altLang="zh-CN" dirty="0" smtClean="0"/>
+              <a:t>                    @</a:t>
+            </a:r>
+            <a:r>
+              <a:rPr lang="en-US" altLang="zh-CN" dirty="0" err="1" smtClean="0"/>
+              <a:t>SuppressWarnings</a:t>
+            </a:r>
+            <a:r>
+              <a:rPr lang="zh-CN" altLang="en-US" dirty="0" smtClean="0"/>
+              <a:t>修饰某个类取消显示某个编译器警告，同时又修饰该</a:t>
+            </a:r>
+            <a:r>
+              <a:rPr lang="zh-CN" altLang="en-US" dirty="0"/>
+              <a:t>类里的某个方法取消显示另</a:t>
+            </a:r>
+            <a:r>
+              <a:rPr lang="zh-CN" altLang="en-US" dirty="0" smtClean="0"/>
+              <a:t>一 </a:t>
+            </a:r>
+            <a:endParaRPr lang="en-US" altLang="zh-CN" dirty="0" smtClean="0"/>
+          </a:p>
+          <a:p>
+            <a:r>
+              <a:rPr lang="en-US" altLang="zh-CN" dirty="0" smtClean="0"/>
+              <a:t>                     </a:t>
+            </a:r>
+            <a:r>
+              <a:rPr lang="zh-CN" altLang="en-US" dirty="0" smtClean="0"/>
+              <a:t>个</a:t>
+            </a:r>
+            <a:r>
+              <a:rPr lang="zh-CN" altLang="en-US" dirty="0"/>
+              <a:t>编译器警告，那么该方法将会同</a:t>
+            </a:r>
+            <a:r>
+              <a:rPr lang="zh-CN" altLang="en-US" dirty="0" smtClean="0"/>
+              <a:t>时取消</a:t>
+            </a:r>
+            <a:r>
+              <a:rPr lang="zh-CN" altLang="en-US" dirty="0"/>
+              <a:t>显示这两个编译器警告</a:t>
+            </a:r>
+            <a:r>
+              <a:rPr lang="zh-CN" altLang="en-US" dirty="0" smtClean="0"/>
+              <a:t>。</a:t>
+            </a:r>
+            <a:endParaRPr lang="en-US" altLang="zh-CN" dirty="0" smtClean="0"/>
+          </a:p>
+          <a:p>
+            <a:r>
+              <a:rPr lang="en-US" altLang="zh-TW" dirty="0"/>
+              <a:t>	</a:t>
+            </a:r>
+            <a:r>
+              <a:rPr lang="en-US" altLang="zh-TW" dirty="0"/>
+              <a:t>	 @</a:t>
+            </a:r>
+            <a:r>
+              <a:rPr lang="en-US" altLang="zh-TW" dirty="0" err="1"/>
+              <a:t>SuppressWarnings</a:t>
+            </a:r>
+            <a:r>
+              <a:rPr lang="en-US" altLang="zh-TW" dirty="0"/>
+              <a:t>(value = "unchecked")</a:t>
             </a:r>
             <a:endParaRPr lang="zh-TW" altLang="en-US" dirty="0"/>
           </a:p>
@@ -3678,6 +3887,74 @@
     <p:extLst>
       <p:ext uri="{BB962C8B-B14F-4D97-AF65-F5344CB8AC3E}">
         <p14:creationId xmlns:p14="http://schemas.microsoft.com/office/powerpoint/2010/main" val="1907639038"/>
+      </p:ext>
+    </p:extLst>
+  </p:cSld>
+  <p:clrMapOvr>
+    <a:masterClrMapping/>
+  </p:clrMapOvr>
+</p:sld>
+</file>
+
+<file path=ppt/slides/slide4.xml><?xml version="1.0" encoding="utf-8"?>
+<p:sld xmlns:a="http://schemas.openxmlformats.org/drawingml/2006/main" xmlns:r="http://schemas.openxmlformats.org/officeDocument/2006/relationships" xmlns:p="http://schemas.openxmlformats.org/presentationml/2006/main">
+  <p:cSld>
+    <p:spTree>
+      <p:nvGrpSpPr>
+        <p:cNvPr id="1" name=""/>
+        <p:cNvGrpSpPr/>
+        <p:nvPr/>
+      </p:nvGrpSpPr>
+      <p:grpSpPr>
+        <a:xfrm>
+          <a:off x="0" y="0"/>
+          <a:ext cx="0" cy="0"/>
+          <a:chOff x="0" y="0"/>
+          <a:chExt cx="0" cy="0"/>
+        </a:xfrm>
+      </p:grpSpPr>
+      <p:sp>
+        <p:nvSpPr>
+          <p:cNvPr id="2" name="标题 1"/>
+          <p:cNvSpPr>
+            <a:spLocks noGrp="1"/>
+          </p:cNvSpPr>
+          <p:nvPr>
+            <p:ph type="title"/>
+          </p:nvPr>
+        </p:nvSpPr>
+        <p:spPr/>
+        <p:txBody>
+          <a:bodyPr/>
+          <a:lstStyle/>
+          <a:p>
+            <a:endParaRPr lang="zh-CN" altLang="en-US"/>
+          </a:p>
+        </p:txBody>
+      </p:sp>
+      <p:sp>
+        <p:nvSpPr>
+          <p:cNvPr id="3" name="内容占位符 2"/>
+          <p:cNvSpPr>
+            <a:spLocks noGrp="1"/>
+          </p:cNvSpPr>
+          <p:nvPr>
+            <p:ph idx="1"/>
+          </p:nvPr>
+        </p:nvSpPr>
+        <p:spPr/>
+        <p:txBody>
+          <a:bodyPr/>
+          <a:lstStyle/>
+          <a:p>
+            <a:endParaRPr lang="zh-CN" altLang="en-US"/>
+          </a:p>
+        </p:txBody>
+      </p:sp>
+    </p:spTree>
+    <p:extLst>
+      <p:ext uri="{BB962C8B-B14F-4D97-AF65-F5344CB8AC3E}">
+        <p14:creationId xmlns:p14="http://schemas.microsoft.com/office/powerpoint/2010/main" val="3838206201"/>
       </p:ext>
     </p:extLst>
   </p:cSld>

</xml_diff>

<commit_message>
Add the annotation into pptx
</commit_message>
<xml_diff>
--- a/JavaStudy/JavaStudyNote/Annotation/Java_Annotation.pptx
+++ b/JavaStudy/JavaStudyNote/Annotation/Java_Annotation.pptx
@@ -262,7 +262,7 @@
           <a:p>
             <a:fld id="{AEE21342-C4FE-49FC-8C54-3FBB3FB89983}" type="datetimeFigureOut">
               <a:rPr lang="zh-TW" altLang="en-US" smtClean="0"/>
-              <a:t>2023/3/1</a:t>
+              <a:t>2023/3/2</a:t>
             </a:fld>
             <a:endParaRPr lang="zh-TW" altLang="en-US"/>
           </a:p>
@@ -460,7 +460,7 @@
           <a:p>
             <a:fld id="{AEE21342-C4FE-49FC-8C54-3FBB3FB89983}" type="datetimeFigureOut">
               <a:rPr lang="zh-TW" altLang="en-US" smtClean="0"/>
-              <a:t>2023/3/1</a:t>
+              <a:t>2023/3/2</a:t>
             </a:fld>
             <a:endParaRPr lang="zh-TW" altLang="en-US"/>
           </a:p>
@@ -668,7 +668,7 @@
           <a:p>
             <a:fld id="{AEE21342-C4FE-49FC-8C54-3FBB3FB89983}" type="datetimeFigureOut">
               <a:rPr lang="zh-TW" altLang="en-US" smtClean="0"/>
-              <a:t>2023/3/1</a:t>
+              <a:t>2023/3/2</a:t>
             </a:fld>
             <a:endParaRPr lang="zh-TW" altLang="en-US"/>
           </a:p>
@@ -866,7 +866,7 @@
           <a:p>
             <a:fld id="{AEE21342-C4FE-49FC-8C54-3FBB3FB89983}" type="datetimeFigureOut">
               <a:rPr lang="zh-TW" altLang="en-US" smtClean="0"/>
-              <a:t>2023/3/1</a:t>
+              <a:t>2023/3/2</a:t>
             </a:fld>
             <a:endParaRPr lang="zh-TW" altLang="en-US"/>
           </a:p>
@@ -1141,7 +1141,7 @@
           <a:p>
             <a:fld id="{AEE21342-C4FE-49FC-8C54-3FBB3FB89983}" type="datetimeFigureOut">
               <a:rPr lang="zh-TW" altLang="en-US" smtClean="0"/>
-              <a:t>2023/3/1</a:t>
+              <a:t>2023/3/2</a:t>
             </a:fld>
             <a:endParaRPr lang="zh-TW" altLang="en-US"/>
           </a:p>
@@ -1406,7 +1406,7 @@
           <a:p>
             <a:fld id="{AEE21342-C4FE-49FC-8C54-3FBB3FB89983}" type="datetimeFigureOut">
               <a:rPr lang="zh-TW" altLang="en-US" smtClean="0"/>
-              <a:t>2023/3/1</a:t>
+              <a:t>2023/3/2</a:t>
             </a:fld>
             <a:endParaRPr lang="zh-TW" altLang="en-US"/>
           </a:p>
@@ -1818,7 +1818,7 @@
           <a:p>
             <a:fld id="{AEE21342-C4FE-49FC-8C54-3FBB3FB89983}" type="datetimeFigureOut">
               <a:rPr lang="zh-TW" altLang="en-US" smtClean="0"/>
-              <a:t>2023/3/1</a:t>
+              <a:t>2023/3/2</a:t>
             </a:fld>
             <a:endParaRPr lang="zh-TW" altLang="en-US"/>
           </a:p>
@@ -1959,7 +1959,7 @@
           <a:p>
             <a:fld id="{AEE21342-C4FE-49FC-8C54-3FBB3FB89983}" type="datetimeFigureOut">
               <a:rPr lang="zh-TW" altLang="en-US" smtClean="0"/>
-              <a:t>2023/3/1</a:t>
+              <a:t>2023/3/2</a:t>
             </a:fld>
             <a:endParaRPr lang="zh-TW" altLang="en-US"/>
           </a:p>
@@ -2072,7 +2072,7 @@
           <a:p>
             <a:fld id="{AEE21342-C4FE-49FC-8C54-3FBB3FB89983}" type="datetimeFigureOut">
               <a:rPr lang="zh-TW" altLang="en-US" smtClean="0"/>
-              <a:t>2023/3/1</a:t>
+              <a:t>2023/3/2</a:t>
             </a:fld>
             <a:endParaRPr lang="zh-TW" altLang="en-US"/>
           </a:p>
@@ -2383,7 +2383,7 @@
           <a:p>
             <a:fld id="{AEE21342-C4FE-49FC-8C54-3FBB3FB89983}" type="datetimeFigureOut">
               <a:rPr lang="zh-TW" altLang="en-US" smtClean="0"/>
-              <a:t>2023/3/1</a:t>
+              <a:t>2023/3/2</a:t>
             </a:fld>
             <a:endParaRPr lang="zh-TW" altLang="en-US"/>
           </a:p>
@@ -2671,7 +2671,7 @@
           <a:p>
             <a:fld id="{AEE21342-C4FE-49FC-8C54-3FBB3FB89983}" type="datetimeFigureOut">
               <a:rPr lang="zh-TW" altLang="en-US" smtClean="0"/>
-              <a:t>2023/3/1</a:t>
+              <a:t>2023/3/2</a:t>
             </a:fld>
             <a:endParaRPr lang="zh-TW" altLang="en-US"/>
           </a:p>
@@ -2912,7 +2912,7 @@
           <a:p>
             <a:fld id="{AEE21342-C4FE-49FC-8C54-3FBB3FB89983}" type="datetimeFigureOut">
               <a:rPr lang="zh-TW" altLang="en-US" smtClean="0"/>
-              <a:t>2023/3/1</a:t>
+              <a:t>2023/3/2</a:t>
             </a:fld>
             <a:endParaRPr lang="zh-TW" altLang="en-US"/>
           </a:p>
@@ -3563,7 +3563,7 @@
         <p:spPr>
           <a:xfrm>
             <a:off x="314960" y="203200"/>
-            <a:ext cx="11480800" cy="4247317"/>
+            <a:ext cx="11480800" cy="4801314"/>
           </a:xfrm>
           <a:prstGeom prst="rect">
             <a:avLst/>
@@ -3674,22 +3674,14 @@
             </a:r>
             <a:r>
               <a:rPr lang="zh-CN" altLang="en-US" dirty="0"/>
-              <a:t>编译器将会给出警告</a:t>
-            </a:r>
-            <a:r>
-              <a:rPr lang="zh-CN" altLang="en-US" dirty="0" smtClean="0"/>
-              <a:t>。</a:t>
-            </a:r>
-            <a:endParaRPr lang="en-US" altLang="zh-CN" dirty="0" smtClean="0"/>
+              <a:t>编译器将会给出警告。</a:t>
+            </a:r>
+            <a:endParaRPr lang="en-US" altLang="zh-CN" dirty="0"/>
           </a:p>
           <a:p>
             <a:r>
               <a:rPr lang="en-US" altLang="zh-TW" dirty="0"/>
-              <a:t>		 @Deprecated(since = </a:t>
-            </a:r>
-            <a:r>
-              <a:rPr lang="en-US" altLang="zh-TW" dirty="0" smtClean="0"/>
-              <a:t>“3”, </a:t>
+              <a:t>		 @Deprecated(since = “3”, </a:t>
             </a:r>
             <a:r>
               <a:rPr lang="en-US" altLang="zh-TW" dirty="0" err="1"/>
@@ -3697,55 +3689,51 @@
             </a:r>
             <a:r>
               <a:rPr lang="en-US" altLang="zh-TW" dirty="0"/>
-              <a:t> = true</a:t>
-            </a:r>
-            <a:r>
-              <a:rPr lang="en-US" altLang="zh-TW" dirty="0" smtClean="0"/>
-              <a:t>)   </a:t>
-            </a:r>
-            <a:r>
-              <a:rPr lang="en-US" altLang="zh-CN" dirty="0" smtClean="0"/>
+              <a:t> = true)   </a:t>
+            </a:r>
+            <a:r>
+              <a:rPr lang="en-US" altLang="zh-CN" dirty="0"/>
               <a:t>since</a:t>
             </a:r>
             <a:r>
-              <a:rPr lang="zh-CN" altLang="en-US" dirty="0" smtClean="0"/>
+              <a:rPr lang="zh-CN" altLang="en-US" dirty="0"/>
               <a:t>代表从哪个</a:t>
             </a:r>
             <a:r>
-              <a:rPr lang="en-US" altLang="zh-CN" dirty="0" err="1" smtClean="0"/>
+              <a:rPr lang="en-US" altLang="zh-CN" dirty="0" err="1"/>
               <a:t>jdk</a:t>
             </a:r>
             <a:r>
-              <a:rPr lang="zh-CN" altLang="en-US" dirty="0" smtClean="0"/>
+              <a:rPr lang="zh-CN" altLang="en-US" dirty="0"/>
               <a:t>开始 </a:t>
             </a:r>
             <a:r>
-              <a:rPr lang="en-US" altLang="zh-TW" dirty="0" err="1" smtClean="0"/>
+              <a:rPr lang="en-US" altLang="zh-TW" dirty="0" err="1"/>
               <a:t>forRemoval</a:t>
             </a:r>
             <a:r>
-              <a:rPr lang="zh-CN" altLang="en-US" dirty="0" smtClean="0"/>
+              <a:rPr lang="zh-CN" altLang="en-US" dirty="0"/>
               <a:t>代表是否会被移</a:t>
             </a:r>
-            <a:endParaRPr lang="en-US" altLang="zh-CN" dirty="0" smtClean="0"/>
-          </a:p>
-          <a:p>
-            <a:r>
-              <a:rPr lang="en-US" altLang="zh-CN" dirty="0" smtClean="0"/>
+            <a:endParaRPr lang="en-US" altLang="zh-CN" dirty="0"/>
+          </a:p>
+          <a:p>
+            <a:r>
+              <a:rPr lang="en-US" altLang="zh-CN" dirty="0"/>
               <a:t>                                     </a:t>
             </a:r>
             <a:r>
-              <a:rPr lang="zh-CN" altLang="en-US" dirty="0" smtClean="0"/>
+              <a:rPr lang="zh-CN" altLang="en-US" dirty="0"/>
               <a:t>除未来</a:t>
             </a:r>
-            <a:endParaRPr lang="en-US" altLang="zh-CN" dirty="0" smtClean="0"/>
+            <a:endParaRPr lang="en-US" altLang="zh-CN" dirty="0"/>
           </a:p>
           <a:p>
             <a:endParaRPr lang="en-US" altLang="zh-TW" dirty="0"/>
           </a:p>
           <a:p>
             <a:r>
-              <a:rPr lang="en-US" altLang="zh-TW" dirty="0" smtClean="0"/>
+              <a:rPr lang="en-US" altLang="zh-TW" dirty="0"/>
               <a:t>	3.</a:t>
             </a:r>
             <a:r>
@@ -3758,118 +3746,62 @@
             </a:r>
             <a:r>
               <a:rPr lang="zh-CN" altLang="en-US" dirty="0"/>
-              <a:t>指示被该注解修饰的程序元素（以及该程序</a:t>
-            </a:r>
-            <a:r>
-              <a:rPr lang="zh-CN" altLang="en-US" dirty="0" smtClean="0"/>
-              <a:t>元素</a:t>
+              <a:t>指示被该注解修饰的程序元素（以及该程序元素中的所有子元素）取消显示指定的</a:t>
+            </a:r>
+            <a:endParaRPr lang="en-US" altLang="zh-CN" dirty="0"/>
+          </a:p>
+          <a:p>
+            <a:r>
+              <a:rPr lang="en-US" altLang="zh-CN" dirty="0"/>
+              <a:t>                     </a:t>
             </a:r>
             <a:r>
               <a:rPr lang="zh-CN" altLang="en-US" dirty="0"/>
-              <a:t>中的所有子元素）取消显示指定</a:t>
-            </a:r>
-            <a:r>
-              <a:rPr lang="zh-CN" altLang="en-US" dirty="0" smtClean="0"/>
-              <a:t>的</a:t>
-            </a:r>
-            <a:endParaRPr lang="en-US" altLang="zh-CN" dirty="0" smtClean="0"/>
-          </a:p>
-          <a:p>
-            <a:r>
-              <a:rPr lang="en-US" altLang="zh-CN" dirty="0" smtClean="0"/>
-              <a:t>                     </a:t>
-            </a:r>
-            <a:r>
-              <a:rPr lang="zh-CN" altLang="en-US" dirty="0" smtClean="0"/>
-              <a:t>编译器</a:t>
-            </a:r>
-            <a:r>
-              <a:rPr lang="zh-CN" altLang="en-US" dirty="0"/>
-              <a:t>警告。</a:t>
+              <a:t>编译器警告。</a:t>
             </a:r>
             <a:r>
               <a:rPr lang="en-US" altLang="zh-CN" dirty="0"/>
               <a:t>@</a:t>
             </a:r>
             <a:r>
-              <a:rPr lang="en-US" altLang="zh-CN" dirty="0" err="1" smtClean="0"/>
+              <a:rPr lang="en-US" altLang="zh-CN" dirty="0" err="1"/>
               <a:t>SuppressWarnings</a:t>
             </a:r>
             <a:r>
-              <a:rPr lang="zh-CN" altLang="en-US" dirty="0" smtClean="0"/>
-              <a:t>会</a:t>
-            </a:r>
-            <a:r>
               <a:rPr lang="zh-CN" altLang="en-US" dirty="0"/>
-              <a:t>一直作用于该程序元素的所有子元素， 例如， </a:t>
-            </a:r>
-            <a:r>
-              <a:rPr lang="zh-CN" altLang="en-US" dirty="0" smtClean="0"/>
-              <a:t>使用</a:t>
+              <a:t>会一直作用于该程序元素的所有子元素， 例如， 使用</a:t>
             </a:r>
           </a:p>
           <a:p>
             <a:r>
               <a:rPr lang="en-US" altLang="zh-CN" dirty="0"/>
-              <a:t> </a:t>
-            </a:r>
-            <a:r>
-              <a:rPr lang="en-US" altLang="zh-CN" dirty="0" smtClean="0"/>
-              <a:t>                    @</a:t>
-            </a:r>
-            <a:r>
-              <a:rPr lang="en-US" altLang="zh-CN" dirty="0" err="1" smtClean="0"/>
+              <a:t>                     @</a:t>
+            </a:r>
+            <a:r>
+              <a:rPr lang="en-US" altLang="zh-CN" dirty="0" err="1"/>
               <a:t>SuppressWarnings</a:t>
             </a:r>
             <a:r>
-              <a:rPr lang="zh-CN" altLang="en-US" dirty="0" smtClean="0"/>
-              <a:t>修饰某个类取消显示某个编译器警告，同时又修饰该</a:t>
-            </a:r>
-            <a:r>
               <a:rPr lang="zh-CN" altLang="en-US" dirty="0"/>
-              <a:t>类里的某个方法取消显示另</a:t>
-            </a:r>
-            <a:r>
-              <a:rPr lang="zh-CN" altLang="en-US" dirty="0" smtClean="0"/>
-              <a:t>一 </a:t>
-            </a:r>
-            <a:endParaRPr lang="en-US" altLang="zh-CN" dirty="0" smtClean="0"/>
-          </a:p>
-          <a:p>
-            <a:r>
-              <a:rPr lang="en-US" altLang="zh-CN" dirty="0" smtClean="0"/>
+              <a:t>修饰某个类取消显示某个编译器警告，同时又修饰该类里的某个方法取消显示另一 </a:t>
+            </a:r>
+            <a:endParaRPr lang="en-US" altLang="zh-CN" dirty="0"/>
+          </a:p>
+          <a:p>
+            <a:r>
+              <a:rPr lang="en-US" altLang="zh-CN" dirty="0"/>
               <a:t>                     </a:t>
             </a:r>
             <a:r>
-              <a:rPr lang="zh-CN" altLang="en-US" dirty="0" smtClean="0"/>
-              <a:t>个</a:t>
-            </a:r>
-            <a:r>
               <a:rPr lang="zh-CN" altLang="en-US" dirty="0"/>
-              <a:t>编译器警告，那么该方法将会同</a:t>
-            </a:r>
-            <a:r>
-              <a:rPr lang="zh-CN" altLang="en-US" dirty="0" smtClean="0"/>
-              <a:t>时取消</a:t>
-            </a:r>
-            <a:r>
-              <a:rPr lang="zh-CN" altLang="en-US" dirty="0"/>
-              <a:t>显示这两个编译器警告</a:t>
-            </a:r>
-            <a:r>
-              <a:rPr lang="zh-CN" altLang="en-US" dirty="0" smtClean="0"/>
-              <a:t>。</a:t>
-            </a:r>
-            <a:endParaRPr lang="en-US" altLang="zh-CN" dirty="0" smtClean="0"/>
+              <a:t>个编译器警告，那么该方法将会同时取消显示这两个编译器警告。</a:t>
+            </a:r>
+            <a:endParaRPr lang="en-US" altLang="zh-CN" dirty="0"/>
           </a:p>
           <a:p>
             <a:r>
               <a:rPr lang="en-US" altLang="zh-TW" dirty="0"/>
-              <a:t>	</a:t>
-            </a:r>
-            <a:r>
-              <a:rPr lang="en-US" altLang="zh-TW" dirty="0"/>
-              <a:t>	 @</a:t>
+              <a:t>		 @</a:t>
             </a:r>
             <a:r>
               <a:rPr lang="en-US" altLang="zh-TW" dirty="0" err="1"/>
@@ -3878,6 +3810,15 @@
             <a:r>
               <a:rPr lang="en-US" altLang="zh-TW" dirty="0"/>
               <a:t>(value = "unchecked")</a:t>
+            </a:r>
+          </a:p>
+          <a:p>
+            <a:endParaRPr lang="en-US" altLang="zh-TW" dirty="0"/>
+          </a:p>
+          <a:p>
+            <a:r>
+              <a:rPr lang="en-US" altLang="zh-TW"/>
+              <a:t>	</a:t>
             </a:r>
             <a:endParaRPr lang="zh-TW" altLang="en-US" dirty="0"/>
           </a:p>

</xml_diff>

<commit_message>
Add the annotion study into pptx
</commit_message>
<xml_diff>
--- a/JavaStudy/JavaStudyNote/Annotation/Java_Annotation.pptx
+++ b/JavaStudy/JavaStudyNote/Annotation/Java_Annotation.pptx
@@ -262,7 +262,7 @@
           <a:p>
             <a:fld id="{AEE21342-C4FE-49FC-8C54-3FBB3FB89983}" type="datetimeFigureOut">
               <a:rPr lang="zh-TW" altLang="en-US" smtClean="0"/>
-              <a:t>2023/3/2</a:t>
+              <a:t>2023/3/5</a:t>
             </a:fld>
             <a:endParaRPr lang="zh-TW" altLang="en-US"/>
           </a:p>
@@ -460,7 +460,7 @@
           <a:p>
             <a:fld id="{AEE21342-C4FE-49FC-8C54-3FBB3FB89983}" type="datetimeFigureOut">
               <a:rPr lang="zh-TW" altLang="en-US" smtClean="0"/>
-              <a:t>2023/3/2</a:t>
+              <a:t>2023/3/5</a:t>
             </a:fld>
             <a:endParaRPr lang="zh-TW" altLang="en-US"/>
           </a:p>
@@ -668,7 +668,7 @@
           <a:p>
             <a:fld id="{AEE21342-C4FE-49FC-8C54-3FBB3FB89983}" type="datetimeFigureOut">
               <a:rPr lang="zh-TW" altLang="en-US" smtClean="0"/>
-              <a:t>2023/3/2</a:t>
+              <a:t>2023/3/5</a:t>
             </a:fld>
             <a:endParaRPr lang="zh-TW" altLang="en-US"/>
           </a:p>
@@ -866,7 +866,7 @@
           <a:p>
             <a:fld id="{AEE21342-C4FE-49FC-8C54-3FBB3FB89983}" type="datetimeFigureOut">
               <a:rPr lang="zh-TW" altLang="en-US" smtClean="0"/>
-              <a:t>2023/3/2</a:t>
+              <a:t>2023/3/5</a:t>
             </a:fld>
             <a:endParaRPr lang="zh-TW" altLang="en-US"/>
           </a:p>
@@ -1141,7 +1141,7 @@
           <a:p>
             <a:fld id="{AEE21342-C4FE-49FC-8C54-3FBB3FB89983}" type="datetimeFigureOut">
               <a:rPr lang="zh-TW" altLang="en-US" smtClean="0"/>
-              <a:t>2023/3/2</a:t>
+              <a:t>2023/3/5</a:t>
             </a:fld>
             <a:endParaRPr lang="zh-TW" altLang="en-US"/>
           </a:p>
@@ -1406,7 +1406,7 @@
           <a:p>
             <a:fld id="{AEE21342-C4FE-49FC-8C54-3FBB3FB89983}" type="datetimeFigureOut">
               <a:rPr lang="zh-TW" altLang="en-US" smtClean="0"/>
-              <a:t>2023/3/2</a:t>
+              <a:t>2023/3/5</a:t>
             </a:fld>
             <a:endParaRPr lang="zh-TW" altLang="en-US"/>
           </a:p>
@@ -1818,7 +1818,7 @@
           <a:p>
             <a:fld id="{AEE21342-C4FE-49FC-8C54-3FBB3FB89983}" type="datetimeFigureOut">
               <a:rPr lang="zh-TW" altLang="en-US" smtClean="0"/>
-              <a:t>2023/3/2</a:t>
+              <a:t>2023/3/5</a:t>
             </a:fld>
             <a:endParaRPr lang="zh-TW" altLang="en-US"/>
           </a:p>
@@ -1959,7 +1959,7 @@
           <a:p>
             <a:fld id="{AEE21342-C4FE-49FC-8C54-3FBB3FB89983}" type="datetimeFigureOut">
               <a:rPr lang="zh-TW" altLang="en-US" smtClean="0"/>
-              <a:t>2023/3/2</a:t>
+              <a:t>2023/3/5</a:t>
             </a:fld>
             <a:endParaRPr lang="zh-TW" altLang="en-US"/>
           </a:p>
@@ -2072,7 +2072,7 @@
           <a:p>
             <a:fld id="{AEE21342-C4FE-49FC-8C54-3FBB3FB89983}" type="datetimeFigureOut">
               <a:rPr lang="zh-TW" altLang="en-US" smtClean="0"/>
-              <a:t>2023/3/2</a:t>
+              <a:t>2023/3/5</a:t>
             </a:fld>
             <a:endParaRPr lang="zh-TW" altLang="en-US"/>
           </a:p>
@@ -2383,7 +2383,7 @@
           <a:p>
             <a:fld id="{AEE21342-C4FE-49FC-8C54-3FBB3FB89983}" type="datetimeFigureOut">
               <a:rPr lang="zh-TW" altLang="en-US" smtClean="0"/>
-              <a:t>2023/3/2</a:t>
+              <a:t>2023/3/5</a:t>
             </a:fld>
             <a:endParaRPr lang="zh-TW" altLang="en-US"/>
           </a:p>
@@ -2671,7 +2671,7 @@
           <a:p>
             <a:fld id="{AEE21342-C4FE-49FC-8C54-3FBB3FB89983}" type="datetimeFigureOut">
               <a:rPr lang="zh-TW" altLang="en-US" smtClean="0"/>
-              <a:t>2023/3/2</a:t>
+              <a:t>2023/3/5</a:t>
             </a:fld>
             <a:endParaRPr lang="zh-TW" altLang="en-US"/>
           </a:p>
@@ -2912,7 +2912,7 @@
           <a:p>
             <a:fld id="{AEE21342-C4FE-49FC-8C54-3FBB3FB89983}" type="datetimeFigureOut">
               <a:rPr lang="zh-TW" altLang="en-US" smtClean="0"/>
-              <a:t>2023/3/2</a:t>
+              <a:t>2023/3/5</a:t>
             </a:fld>
             <a:endParaRPr lang="zh-TW" altLang="en-US"/>
           </a:p>
@@ -3856,46 +3856,402 @@
       </p:grpSpPr>
       <p:sp>
         <p:nvSpPr>
-          <p:cNvPr id="2" name="标题 1"/>
-          <p:cNvSpPr>
-            <a:spLocks noGrp="1"/>
-          </p:cNvSpPr>
-          <p:nvPr>
-            <p:ph type="title"/>
-          </p:nvPr>
-        </p:nvSpPr>
-        <p:spPr/>
-        <p:txBody>
-          <a:bodyPr/>
-          <a:lstStyle/>
-          <a:p>
-            <a:endParaRPr lang="zh-CN" altLang="en-US"/>
-          </a:p>
-        </p:txBody>
-      </p:sp>
-      <p:sp>
-        <p:nvSpPr>
-          <p:cNvPr id="3" name="内容占位符 2"/>
-          <p:cNvSpPr>
-            <a:spLocks noGrp="1"/>
-          </p:cNvSpPr>
-          <p:nvPr>
-            <p:ph idx="1"/>
-          </p:nvPr>
-        </p:nvSpPr>
-        <p:spPr/>
-        <p:txBody>
-          <a:bodyPr/>
-          <a:lstStyle/>
-          <a:p>
-            <a:endParaRPr lang="zh-CN" altLang="en-US"/>
+          <p:cNvPr id="5" name="文本框 4"/>
+          <p:cNvSpPr txBox="1"/>
+          <p:nvPr/>
+        </p:nvSpPr>
+        <p:spPr>
+          <a:xfrm>
+            <a:off x="401782" y="346364"/>
+            <a:ext cx="11249891" cy="5355312"/>
+          </a:xfrm>
+          <a:prstGeom prst="rect">
+            <a:avLst/>
+          </a:prstGeom>
+          <a:noFill/>
+        </p:spPr>
+        <p:txBody>
+          <a:bodyPr wrap="square" rtlCol="0">
+            <a:spAutoFit/>
+          </a:bodyPr>
+          <a:lstStyle/>
+          <a:p>
+            <a:r>
+              <a:rPr lang="en-US" altLang="zh-CN" dirty="0" smtClean="0"/>
+              <a:t>JDK</a:t>
+            </a:r>
+            <a:r>
+              <a:rPr lang="zh-CN" altLang="en-US" dirty="0" smtClean="0"/>
+              <a:t>元注解</a:t>
+            </a:r>
+            <a:endParaRPr lang="en-US" altLang="zh-CN" dirty="0" smtClean="0"/>
+          </a:p>
+          <a:p>
+            <a:endParaRPr lang="en-US" altLang="zh-CN" dirty="0"/>
+          </a:p>
+          <a:p>
+            <a:r>
+              <a:rPr lang="en-US" altLang="zh-CN" dirty="0" smtClean="0"/>
+              <a:t>	1. </a:t>
+            </a:r>
+            <a:r>
+              <a:rPr lang="en-US" altLang="zh-CN" dirty="0"/>
+              <a:t>@Retention</a:t>
+            </a:r>
+            <a:r>
+              <a:rPr lang="zh-CN" altLang="en-US" dirty="0"/>
+              <a:t>只能用于修饰注解定义，用于指定被修饰的注解</a:t>
+            </a:r>
+            <a:r>
+              <a:rPr lang="zh-CN" altLang="en-US" dirty="0" smtClean="0"/>
+              <a:t>可以保留</a:t>
+            </a:r>
+            <a:r>
+              <a:rPr lang="zh-CN" altLang="en-US" dirty="0"/>
+              <a:t>多长</a:t>
+            </a:r>
+            <a:r>
+              <a:rPr lang="zh-CN" altLang="en-US" dirty="0" smtClean="0"/>
+              <a:t>时间</a:t>
+            </a:r>
+            <a:endParaRPr lang="en-US" altLang="zh-CN" dirty="0" smtClean="0"/>
+          </a:p>
+          <a:p>
+            <a:r>
+              <a:rPr lang="en-US" altLang="zh-CN" dirty="0" smtClean="0"/>
+              <a:t>	     value</a:t>
+            </a:r>
+            <a:r>
+              <a:rPr lang="zh-CN" altLang="en-US" dirty="0"/>
+              <a:t>成员变量的值只能是如下三个。</a:t>
+            </a:r>
+          </a:p>
+          <a:p>
+            <a:r>
+              <a:rPr lang="en-US" altLang="zh-CN" dirty="0" smtClean="0"/>
+              <a:t>		➢ </a:t>
+            </a:r>
+            <a:r>
+              <a:rPr lang="en-US" altLang="zh-CN" dirty="0" err="1"/>
+              <a:t>RetentionPolicy.CLASS</a:t>
+            </a:r>
+            <a:r>
+              <a:rPr lang="zh-CN" altLang="en-US" dirty="0"/>
+              <a:t>：编译器将把注解记录在</a:t>
+            </a:r>
+            <a:r>
+              <a:rPr lang="en-US" altLang="zh-CN" dirty="0"/>
+              <a:t>class</a:t>
+            </a:r>
+            <a:r>
+              <a:rPr lang="zh-CN" altLang="en-US" dirty="0" smtClean="0"/>
+              <a:t>文件中</a:t>
+            </a:r>
+            <a:r>
+              <a:rPr lang="zh-CN" altLang="en-US" dirty="0"/>
+              <a:t>。当运行</a:t>
+            </a:r>
+            <a:r>
+              <a:rPr lang="en-US" altLang="zh-CN" dirty="0"/>
+              <a:t>Java</a:t>
+            </a:r>
+            <a:r>
+              <a:rPr lang="zh-CN" altLang="en-US" dirty="0"/>
+              <a:t>程序时</a:t>
+            </a:r>
+            <a:r>
+              <a:rPr lang="zh-CN" altLang="en-US" dirty="0" smtClean="0"/>
+              <a:t>，   </a:t>
+            </a:r>
+            <a:endParaRPr lang="en-US" altLang="zh-CN" dirty="0" smtClean="0"/>
+          </a:p>
+          <a:p>
+            <a:r>
+              <a:rPr lang="en-US" altLang="zh-CN" dirty="0" smtClean="0"/>
+              <a:t>                                                          JVM</a:t>
+            </a:r>
+            <a:r>
+              <a:rPr lang="zh-CN" altLang="en-US" dirty="0"/>
+              <a:t>不可获取注解信息。这是默认值。</a:t>
+            </a:r>
+          </a:p>
+          <a:p>
+            <a:r>
+              <a:rPr lang="en-US" altLang="zh-CN" dirty="0"/>
+              <a:t> </a:t>
+            </a:r>
+            <a:r>
+              <a:rPr lang="en-US" altLang="zh-CN" dirty="0" smtClean="0"/>
+              <a:t>                                  ➢ </a:t>
+            </a:r>
+            <a:r>
+              <a:rPr lang="en-US" altLang="zh-CN" dirty="0" err="1"/>
+              <a:t>RetentionPolicy.RUNTIME</a:t>
+            </a:r>
+            <a:r>
+              <a:rPr lang="zh-CN" altLang="en-US" dirty="0"/>
+              <a:t>：编译器将把注解记录在</a:t>
+            </a:r>
+            <a:r>
+              <a:rPr lang="en-US" altLang="zh-CN" dirty="0"/>
+              <a:t>class</a:t>
+            </a:r>
+            <a:r>
+              <a:rPr lang="zh-CN" altLang="en-US" dirty="0" smtClean="0"/>
+              <a:t>文件中</a:t>
+            </a:r>
+            <a:r>
+              <a:rPr lang="zh-CN" altLang="en-US" dirty="0"/>
+              <a:t>。当运行</a:t>
+            </a:r>
+            <a:r>
+              <a:rPr lang="en-US" altLang="zh-CN" dirty="0"/>
+              <a:t>Java</a:t>
+            </a:r>
+            <a:r>
+              <a:rPr lang="zh-CN" altLang="en-US" dirty="0"/>
+              <a:t>程序时</a:t>
+            </a:r>
+            <a:r>
+              <a:rPr lang="zh-CN" altLang="en-US" dirty="0" smtClean="0"/>
+              <a:t>，  </a:t>
+            </a:r>
+            <a:endParaRPr lang="en-US" altLang="zh-CN" dirty="0" smtClean="0"/>
+          </a:p>
+          <a:p>
+            <a:r>
+              <a:rPr lang="en-US" altLang="zh-CN" dirty="0" smtClean="0"/>
+              <a:t>                                                        JVM</a:t>
+            </a:r>
+            <a:r>
+              <a:rPr lang="zh-CN" altLang="en-US" dirty="0"/>
+              <a:t>也可获取注解信息，程序可以</a:t>
+            </a:r>
+            <a:r>
+              <a:rPr lang="zh-CN" altLang="en-US" dirty="0" smtClean="0"/>
+              <a:t>通过反射</a:t>
+            </a:r>
+            <a:r>
+              <a:rPr lang="zh-CN" altLang="en-US" dirty="0"/>
+              <a:t>获取该注解信息。</a:t>
+            </a:r>
+          </a:p>
+          <a:p>
+            <a:r>
+              <a:rPr lang="en-US" altLang="zh-CN" dirty="0" smtClean="0"/>
+              <a:t>		➢ </a:t>
+            </a:r>
+            <a:r>
+              <a:rPr lang="en-US" altLang="zh-CN" dirty="0" err="1"/>
+              <a:t>RetentionPolicy.SOURCE</a:t>
+            </a:r>
+            <a:r>
+              <a:rPr lang="zh-CN" altLang="en-US" dirty="0"/>
+              <a:t>：注解只保留在源代码中，编译器</a:t>
+            </a:r>
+            <a:r>
+              <a:rPr lang="zh-CN" altLang="en-US" dirty="0" smtClean="0"/>
+              <a:t>直接</a:t>
+            </a:r>
+            <a:r>
+              <a:rPr lang="zh-CN" altLang="en-US" dirty="0"/>
+              <a:t>丢弃这种注解</a:t>
+            </a:r>
+            <a:r>
+              <a:rPr lang="zh-CN" altLang="en-US" dirty="0" smtClean="0"/>
+              <a:t>。</a:t>
+            </a:r>
+            <a:endParaRPr lang="en-US" altLang="zh-CN" dirty="0" smtClean="0"/>
+          </a:p>
+          <a:p>
+            <a:endParaRPr lang="en-US" altLang="zh-CN" dirty="0"/>
+          </a:p>
+          <a:p>
+            <a:r>
+              <a:rPr lang="en-US" altLang="zh-CN" dirty="0" smtClean="0"/>
+              <a:t>	2. </a:t>
+            </a:r>
+            <a:r>
+              <a:rPr lang="en-US" altLang="zh-CN" dirty="0"/>
+              <a:t>@Target</a:t>
+            </a:r>
+            <a:r>
+              <a:rPr lang="zh-CN" altLang="en-US" dirty="0"/>
+              <a:t>也只能修饰注解定义，它用于指定被修饰的注解能用于</a:t>
+            </a:r>
+            <a:r>
+              <a:rPr lang="zh-CN" altLang="en-US" dirty="0" smtClean="0"/>
+              <a:t>修饰</a:t>
+            </a:r>
+            <a:r>
+              <a:rPr lang="zh-CN" altLang="en-US" dirty="0"/>
+              <a:t>哪些程序单元</a:t>
+            </a:r>
+            <a:r>
+              <a:rPr lang="zh-CN" altLang="en-US" dirty="0" smtClean="0"/>
+              <a:t>。</a:t>
+            </a:r>
+            <a:endParaRPr lang="en-US" altLang="zh-CN" dirty="0" smtClean="0"/>
+          </a:p>
+          <a:p>
+            <a:r>
+              <a:rPr lang="en-US" altLang="zh-CN" dirty="0"/>
+              <a:t>	</a:t>
+            </a:r>
+            <a:r>
+              <a:rPr lang="en-US" altLang="zh-CN" dirty="0" smtClean="0"/>
+              <a:t>	</a:t>
+            </a:r>
+            <a:r>
+              <a:rPr lang="en-US" altLang="zh-CN" dirty="0"/>
+              <a:t>➢ </a:t>
+            </a:r>
+            <a:r>
+              <a:rPr lang="en-US" altLang="zh-CN" dirty="0" err="1"/>
+              <a:t>ElementType.ANNOTATION_TYPE</a:t>
+            </a:r>
+            <a:r>
+              <a:rPr lang="zh-CN" altLang="en-US" dirty="0"/>
+              <a:t>：指定该策略的注解只能</a:t>
+            </a:r>
+            <a:r>
+              <a:rPr lang="zh-CN" altLang="en-US" dirty="0" smtClean="0"/>
+              <a:t>修饰注解</a:t>
+            </a:r>
+            <a:r>
+              <a:rPr lang="zh-CN" altLang="en-US" dirty="0"/>
+              <a:t>。</a:t>
+            </a:r>
+          </a:p>
+          <a:p>
+            <a:r>
+              <a:rPr lang="en-US" altLang="zh-CN" dirty="0" smtClean="0"/>
+              <a:t>		➢ </a:t>
+            </a:r>
+            <a:r>
+              <a:rPr lang="en-US" altLang="zh-CN" dirty="0" err="1"/>
+              <a:t>ElementType.CONSTRUCTOR</a:t>
+            </a:r>
+            <a:r>
+              <a:rPr lang="zh-CN" altLang="en-US" dirty="0"/>
+              <a:t>：指定该策略的注解只能修饰</a:t>
+            </a:r>
+            <a:r>
+              <a:rPr lang="zh-CN" altLang="en-US" dirty="0" smtClean="0"/>
+              <a:t>构造器</a:t>
+            </a:r>
+            <a:r>
+              <a:rPr lang="zh-CN" altLang="en-US" dirty="0"/>
+              <a:t>。</a:t>
+            </a:r>
+          </a:p>
+          <a:p>
+            <a:r>
+              <a:rPr lang="en-US" altLang="zh-CN" dirty="0" smtClean="0"/>
+              <a:t>		➢ </a:t>
+            </a:r>
+            <a:r>
+              <a:rPr lang="en-US" altLang="zh-CN" dirty="0" err="1"/>
+              <a:t>ElementType.FIELD</a:t>
+            </a:r>
+            <a:r>
+              <a:rPr lang="zh-CN" altLang="en-US" dirty="0"/>
+              <a:t>：指定该策略的注解只能修饰成员变量。</a:t>
+            </a:r>
+          </a:p>
+          <a:p>
+            <a:r>
+              <a:rPr lang="en-US" altLang="zh-CN" dirty="0" smtClean="0"/>
+              <a:t>		➢ </a:t>
+            </a:r>
+            <a:r>
+              <a:rPr lang="en-US" altLang="zh-CN" dirty="0" err="1"/>
+              <a:t>ElementType.LOCAL_VARIABLE</a:t>
+            </a:r>
+            <a:r>
+              <a:rPr lang="zh-CN" altLang="en-US" dirty="0"/>
+              <a:t>：指定该策略的注解只能修饰</a:t>
+            </a:r>
+            <a:r>
+              <a:rPr lang="zh-CN" altLang="en-US" dirty="0" smtClean="0"/>
+              <a:t>局部变量</a:t>
+            </a:r>
+            <a:r>
+              <a:rPr lang="zh-CN" altLang="en-US" dirty="0"/>
+              <a:t>。</a:t>
+            </a:r>
+          </a:p>
+          <a:p>
+            <a:r>
+              <a:rPr lang="en-US" altLang="zh-CN" dirty="0" smtClean="0"/>
+              <a:t>		➢ </a:t>
+            </a:r>
+            <a:r>
+              <a:rPr lang="en-US" altLang="zh-CN" dirty="0" err="1"/>
+              <a:t>ElementType.METHOD</a:t>
+            </a:r>
+            <a:r>
+              <a:rPr lang="zh-CN" altLang="en-US" dirty="0"/>
+              <a:t>：指定该策略的注解只能修饰方法定义。</a:t>
+            </a:r>
+          </a:p>
+          <a:p>
+            <a:r>
+              <a:rPr lang="en-US" altLang="zh-CN" dirty="0" smtClean="0"/>
+              <a:t>		➢ </a:t>
+            </a:r>
+            <a:r>
+              <a:rPr lang="en-US" altLang="zh-CN" dirty="0" err="1"/>
+              <a:t>ElementType.PACKAGE</a:t>
+            </a:r>
+            <a:r>
+              <a:rPr lang="zh-CN" altLang="en-US" dirty="0"/>
+              <a:t>：指定该策略的注解只能修饰包定义。</a:t>
+            </a:r>
+          </a:p>
+          <a:p>
+            <a:r>
+              <a:rPr lang="en-US" altLang="zh-CN" dirty="0" smtClean="0"/>
+              <a:t>		➢ </a:t>
+            </a:r>
+            <a:r>
+              <a:rPr lang="en-US" altLang="zh-CN" dirty="0" err="1"/>
+              <a:t>ElementType.PARAMETER</a:t>
+            </a:r>
+            <a:r>
+              <a:rPr lang="zh-CN" altLang="en-US" dirty="0"/>
+              <a:t>：指定该策略的注解可以修饰参数。</a:t>
+            </a:r>
+          </a:p>
+          <a:p>
+            <a:r>
+              <a:rPr lang="en-US" altLang="zh-CN" dirty="0" smtClean="0"/>
+              <a:t>		➢ </a:t>
+            </a:r>
+            <a:r>
+              <a:rPr lang="en-US" altLang="zh-CN" dirty="0" err="1"/>
+              <a:t>ElementType.TYPE</a:t>
+            </a:r>
+            <a:r>
+              <a:rPr lang="zh-CN" altLang="en-US" dirty="0"/>
+              <a:t>：指定该策略的注解可以修饰类、接口（</a:t>
+            </a:r>
+            <a:r>
+              <a:rPr lang="zh-CN" altLang="en-US" dirty="0" smtClean="0"/>
+              <a:t>包括</a:t>
+            </a:r>
+            <a:r>
+              <a:rPr lang="zh-CN" altLang="en-US" dirty="0"/>
+              <a:t>注解类型）或枚举定义。</a:t>
+            </a:r>
+            <a:endParaRPr lang="en-US" altLang="zh-CN" dirty="0"/>
           </a:p>
         </p:txBody>
       </p:sp>
     </p:spTree>
     <p:extLst>
       <p:ext uri="{BB962C8B-B14F-4D97-AF65-F5344CB8AC3E}">
-        <p14:creationId xmlns:p14="http://schemas.microsoft.com/office/powerpoint/2010/main" val="3838206201"/>
+        <p14:creationId xmlns:p14="http://schemas.microsoft.com/office/powerpoint/2010/main" val="3986853482"/>
       </p:ext>
     </p:extLst>
   </p:cSld>

</xml_diff>

<commit_message>
Add the annotation study int pptx
</commit_message>
<xml_diff>
--- a/JavaStudy/JavaStudyNote/Annotation/Java_Annotation.pptx
+++ b/JavaStudy/JavaStudyNote/Annotation/Java_Annotation.pptx
@@ -9,6 +9,7 @@
     <p:sldId id="257" r:id="rId3"/>
     <p:sldId id="258" r:id="rId4"/>
     <p:sldId id="259" r:id="rId5"/>
+    <p:sldId id="260" r:id="rId6"/>
   </p:sldIdLst>
   <p:sldSz cx="12192000" cy="6858000"/>
   <p:notesSz cx="6858000" cy="9144000"/>
@@ -262,7 +263,7 @@
           <a:p>
             <a:fld id="{AEE21342-C4FE-49FC-8C54-3FBB3FB89983}" type="datetimeFigureOut">
               <a:rPr lang="zh-TW" altLang="en-US" smtClean="0"/>
-              <a:t>2023/3/5</a:t>
+              <a:t>2023/3/9</a:t>
             </a:fld>
             <a:endParaRPr lang="zh-TW" altLang="en-US"/>
           </a:p>
@@ -460,7 +461,7 @@
           <a:p>
             <a:fld id="{AEE21342-C4FE-49FC-8C54-3FBB3FB89983}" type="datetimeFigureOut">
               <a:rPr lang="zh-TW" altLang="en-US" smtClean="0"/>
-              <a:t>2023/3/5</a:t>
+              <a:t>2023/3/9</a:t>
             </a:fld>
             <a:endParaRPr lang="zh-TW" altLang="en-US"/>
           </a:p>
@@ -668,7 +669,7 @@
           <a:p>
             <a:fld id="{AEE21342-C4FE-49FC-8C54-3FBB3FB89983}" type="datetimeFigureOut">
               <a:rPr lang="zh-TW" altLang="en-US" smtClean="0"/>
-              <a:t>2023/3/5</a:t>
+              <a:t>2023/3/9</a:t>
             </a:fld>
             <a:endParaRPr lang="zh-TW" altLang="en-US"/>
           </a:p>
@@ -866,7 +867,7 @@
           <a:p>
             <a:fld id="{AEE21342-C4FE-49FC-8C54-3FBB3FB89983}" type="datetimeFigureOut">
               <a:rPr lang="zh-TW" altLang="en-US" smtClean="0"/>
-              <a:t>2023/3/5</a:t>
+              <a:t>2023/3/9</a:t>
             </a:fld>
             <a:endParaRPr lang="zh-TW" altLang="en-US"/>
           </a:p>
@@ -1141,7 +1142,7 @@
           <a:p>
             <a:fld id="{AEE21342-C4FE-49FC-8C54-3FBB3FB89983}" type="datetimeFigureOut">
               <a:rPr lang="zh-TW" altLang="en-US" smtClean="0"/>
-              <a:t>2023/3/5</a:t>
+              <a:t>2023/3/9</a:t>
             </a:fld>
             <a:endParaRPr lang="zh-TW" altLang="en-US"/>
           </a:p>
@@ -1406,7 +1407,7 @@
           <a:p>
             <a:fld id="{AEE21342-C4FE-49FC-8C54-3FBB3FB89983}" type="datetimeFigureOut">
               <a:rPr lang="zh-TW" altLang="en-US" smtClean="0"/>
-              <a:t>2023/3/5</a:t>
+              <a:t>2023/3/9</a:t>
             </a:fld>
             <a:endParaRPr lang="zh-TW" altLang="en-US"/>
           </a:p>
@@ -1818,7 +1819,7 @@
           <a:p>
             <a:fld id="{AEE21342-C4FE-49FC-8C54-3FBB3FB89983}" type="datetimeFigureOut">
               <a:rPr lang="zh-TW" altLang="en-US" smtClean="0"/>
-              <a:t>2023/3/5</a:t>
+              <a:t>2023/3/9</a:t>
             </a:fld>
             <a:endParaRPr lang="zh-TW" altLang="en-US"/>
           </a:p>
@@ -1959,7 +1960,7 @@
           <a:p>
             <a:fld id="{AEE21342-C4FE-49FC-8C54-3FBB3FB89983}" type="datetimeFigureOut">
               <a:rPr lang="zh-TW" altLang="en-US" smtClean="0"/>
-              <a:t>2023/3/5</a:t>
+              <a:t>2023/3/9</a:t>
             </a:fld>
             <a:endParaRPr lang="zh-TW" altLang="en-US"/>
           </a:p>
@@ -2072,7 +2073,7 @@
           <a:p>
             <a:fld id="{AEE21342-C4FE-49FC-8C54-3FBB3FB89983}" type="datetimeFigureOut">
               <a:rPr lang="zh-TW" altLang="en-US" smtClean="0"/>
-              <a:t>2023/3/5</a:t>
+              <a:t>2023/3/9</a:t>
             </a:fld>
             <a:endParaRPr lang="zh-TW" altLang="en-US"/>
           </a:p>
@@ -2383,7 +2384,7 @@
           <a:p>
             <a:fld id="{AEE21342-C4FE-49FC-8C54-3FBB3FB89983}" type="datetimeFigureOut">
               <a:rPr lang="zh-TW" altLang="en-US" smtClean="0"/>
-              <a:t>2023/3/5</a:t>
+              <a:t>2023/3/9</a:t>
             </a:fld>
             <a:endParaRPr lang="zh-TW" altLang="en-US"/>
           </a:p>
@@ -2671,7 +2672,7 @@
           <a:p>
             <a:fld id="{AEE21342-C4FE-49FC-8C54-3FBB3FB89983}" type="datetimeFigureOut">
               <a:rPr lang="zh-TW" altLang="en-US" smtClean="0"/>
-              <a:t>2023/3/5</a:t>
+              <a:t>2023/3/9</a:t>
             </a:fld>
             <a:endParaRPr lang="zh-TW" altLang="en-US"/>
           </a:p>
@@ -2912,7 +2913,7 @@
           <a:p>
             <a:fld id="{AEE21342-C4FE-49FC-8C54-3FBB3FB89983}" type="datetimeFigureOut">
               <a:rPr lang="zh-TW" altLang="en-US" smtClean="0"/>
-              <a:t>2023/3/5</a:t>
+              <a:t>2023/3/9</a:t>
             </a:fld>
             <a:endParaRPr lang="zh-TW" altLang="en-US"/>
           </a:p>
@@ -3577,14 +3578,14 @@
           <a:lstStyle/>
           <a:p>
             <a:r>
-              <a:rPr lang="en-US" altLang="zh-TW" dirty="0"/>
+              <a:rPr lang="en-US" altLang="zh-TW" b="1" u="sng" dirty="0"/>
               <a:t>Annotation</a:t>
             </a:r>
             <a:r>
-              <a:rPr lang="zh-CN" altLang="en-US" dirty="0"/>
+              <a:rPr lang="zh-CN" altLang="en-US" b="1" u="sng" dirty="0"/>
               <a:t>的使用</a:t>
             </a:r>
-            <a:endParaRPr lang="en-US" altLang="zh-CN" dirty="0"/>
+            <a:endParaRPr lang="en-US" altLang="zh-CN" b="1" u="sng" dirty="0"/>
           </a:p>
           <a:p>
             <a:endParaRPr lang="en-US" altLang="zh-TW" dirty="0"/>
@@ -3817,7 +3818,7 @@
           </a:p>
           <a:p>
             <a:r>
-              <a:rPr lang="en-US" altLang="zh-TW"/>
+              <a:rPr lang="en-US" altLang="zh-TW" dirty="0"/>
               <a:t>	</a:t>
             </a:r>
             <a:endParaRPr lang="zh-TW" altLang="en-US" dirty="0"/>
@@ -3863,7 +3864,7 @@
         <p:spPr>
           <a:xfrm>
             <a:off x="401782" y="346364"/>
-            <a:ext cx="11249891" cy="5355312"/>
+            <a:ext cx="11249891" cy="6186309"/>
           </a:xfrm>
           <a:prstGeom prst="rect">
             <a:avLst/>
@@ -3877,48 +3878,32 @@
           <a:lstStyle/>
           <a:p>
             <a:r>
-              <a:rPr lang="en-US" altLang="zh-CN" dirty="0" smtClean="0"/>
+              <a:rPr lang="en-US" altLang="zh-CN" b="1" u="sng" dirty="0"/>
               <a:t>JDK</a:t>
             </a:r>
             <a:r>
-              <a:rPr lang="zh-CN" altLang="en-US" dirty="0" smtClean="0"/>
+              <a:rPr lang="zh-CN" altLang="en-US" b="1" u="sng" dirty="0"/>
               <a:t>元注解</a:t>
             </a:r>
-            <a:endParaRPr lang="en-US" altLang="zh-CN" dirty="0" smtClean="0"/>
+            <a:endParaRPr lang="en-US" altLang="zh-CN" b="1" u="sng" dirty="0"/>
           </a:p>
           <a:p>
             <a:endParaRPr lang="en-US" altLang="zh-CN" dirty="0"/>
           </a:p>
           <a:p>
             <a:r>
-              <a:rPr lang="en-US" altLang="zh-CN" dirty="0" smtClean="0"/>
-              <a:t>	1. </a:t>
-            </a:r>
-            <a:r>
               <a:rPr lang="en-US" altLang="zh-CN" dirty="0"/>
-              <a:t>@Retention</a:t>
+              <a:t>	1. @Retention</a:t>
             </a:r>
             <a:r>
               <a:rPr lang="zh-CN" altLang="en-US" dirty="0"/>
-              <a:t>只能用于修饰注解定义，用于指定被修饰的注解</a:t>
-            </a:r>
-            <a:r>
-              <a:rPr lang="zh-CN" altLang="en-US" dirty="0" smtClean="0"/>
-              <a:t>可以保留</a:t>
-            </a:r>
-            <a:r>
-              <a:rPr lang="zh-CN" altLang="en-US" dirty="0"/>
-              <a:t>多长</a:t>
-            </a:r>
-            <a:r>
-              <a:rPr lang="zh-CN" altLang="en-US" dirty="0" smtClean="0"/>
-              <a:t>时间</a:t>
-            </a:r>
-            <a:endParaRPr lang="en-US" altLang="zh-CN" dirty="0" smtClean="0"/>
-          </a:p>
-          <a:p>
-            <a:r>
-              <a:rPr lang="en-US" altLang="zh-CN" dirty="0" smtClean="0"/>
+              <a:t>只能用于修饰注解定义，用于指定被修饰的注解可以保留多长时间</a:t>
+            </a:r>
+            <a:endParaRPr lang="en-US" altLang="zh-CN" dirty="0"/>
+          </a:p>
+          <a:p>
+            <a:r>
+              <a:rPr lang="en-US" altLang="zh-CN" dirty="0"/>
               <a:t>	     value</a:t>
             </a:r>
             <a:r>
@@ -3928,7 +3913,7 @@
           </a:p>
           <a:p>
             <a:r>
-              <a:rPr lang="en-US" altLang="zh-CN" dirty="0" smtClean="0"/>
+              <a:rPr lang="en-US" altLang="zh-CN" dirty="0"/>
               <a:t>		➢ </a:t>
             </a:r>
             <a:r>
@@ -3944,12 +3929,8 @@
               <a:t>class</a:t>
             </a:r>
             <a:r>
-              <a:rPr lang="zh-CN" altLang="en-US" dirty="0" smtClean="0"/>
-              <a:t>文件中</a:t>
-            </a:r>
-            <a:r>
               <a:rPr lang="zh-CN" altLang="en-US" dirty="0"/>
-              <a:t>。当运行</a:t>
+              <a:t>文件中。当运行</a:t>
             </a:r>
             <a:r>
               <a:rPr lang="en-US" altLang="zh-CN" dirty="0"/>
@@ -3957,17 +3938,13 @@
             </a:r>
             <a:r>
               <a:rPr lang="zh-CN" altLang="en-US" dirty="0"/>
-              <a:t>程序时</a:t>
-            </a:r>
-            <a:r>
-              <a:rPr lang="zh-CN" altLang="en-US" dirty="0" smtClean="0"/>
-              <a:t>，   </a:t>
-            </a:r>
-            <a:endParaRPr lang="en-US" altLang="zh-CN" dirty="0" smtClean="0"/>
-          </a:p>
-          <a:p>
-            <a:r>
-              <a:rPr lang="en-US" altLang="zh-CN" dirty="0" smtClean="0"/>
+              <a:t>程序时，   </a:t>
+            </a:r>
+            <a:endParaRPr lang="en-US" altLang="zh-CN" dirty="0"/>
+          </a:p>
+          <a:p>
+            <a:r>
+              <a:rPr lang="en-US" altLang="zh-CN" dirty="0"/>
               <a:t>                                                          JVM</a:t>
             </a:r>
             <a:r>
@@ -3978,11 +3955,7 @@
           <a:p>
             <a:r>
               <a:rPr lang="en-US" altLang="zh-CN" dirty="0"/>
-              <a:t> </a:t>
-            </a:r>
-            <a:r>
-              <a:rPr lang="en-US" altLang="zh-CN" dirty="0" smtClean="0"/>
-              <a:t>                                  ➢ </a:t>
+              <a:t>                                   ➢ </a:t>
             </a:r>
             <a:r>
               <a:rPr lang="en-US" altLang="zh-CN" dirty="0" err="1"/>
@@ -3997,12 +3970,8 @@
               <a:t>class</a:t>
             </a:r>
             <a:r>
-              <a:rPr lang="zh-CN" altLang="en-US" dirty="0" smtClean="0"/>
-              <a:t>文件中</a:t>
-            </a:r>
-            <a:r>
               <a:rPr lang="zh-CN" altLang="en-US" dirty="0"/>
-              <a:t>。当运行</a:t>
+              <a:t>文件中。当运行</a:t>
             </a:r>
             <a:r>
               <a:rPr lang="en-US" altLang="zh-CN" dirty="0"/>
@@ -4010,35 +3979,23 @@
             </a:r>
             <a:r>
               <a:rPr lang="zh-CN" altLang="en-US" dirty="0"/>
-              <a:t>程序时</a:t>
-            </a:r>
-            <a:r>
-              <a:rPr lang="zh-CN" altLang="en-US" dirty="0" smtClean="0"/>
-              <a:t>，  </a:t>
-            </a:r>
-            <a:endParaRPr lang="en-US" altLang="zh-CN" dirty="0" smtClean="0"/>
-          </a:p>
-          <a:p>
-            <a:r>
-              <a:rPr lang="en-US" altLang="zh-CN" dirty="0" smtClean="0"/>
+              <a:t>程序时，  </a:t>
+            </a:r>
+            <a:endParaRPr lang="en-US" altLang="zh-CN" dirty="0"/>
+          </a:p>
+          <a:p>
+            <a:r>
+              <a:rPr lang="en-US" altLang="zh-CN" dirty="0"/>
               <a:t>                                                        JVM</a:t>
             </a:r>
             <a:r>
               <a:rPr lang="zh-CN" altLang="en-US" dirty="0"/>
-              <a:t>也可获取注解信息，程序可以</a:t>
-            </a:r>
-            <a:r>
-              <a:rPr lang="zh-CN" altLang="en-US" dirty="0" smtClean="0"/>
-              <a:t>通过反射</a:t>
-            </a:r>
-            <a:r>
-              <a:rPr lang="zh-CN" altLang="en-US" dirty="0"/>
-              <a:t>获取该注解信息。</a:t>
-            </a:r>
-          </a:p>
-          <a:p>
-            <a:r>
-              <a:rPr lang="en-US" altLang="zh-CN" dirty="0" smtClean="0"/>
+              <a:t>也可获取注解信息，程序可以通过反射获取该注解信息。</a:t>
+            </a:r>
+          </a:p>
+          <a:p>
+            <a:r>
+              <a:rPr lang="en-US" altLang="zh-CN" dirty="0"/>
               <a:t>		➢ </a:t>
             </a:r>
             <a:r>
@@ -4047,64 +4004,28 @@
             </a:r>
             <a:r>
               <a:rPr lang="zh-CN" altLang="en-US" dirty="0"/>
-              <a:t>：注解只保留在源代码中，编译器</a:t>
-            </a:r>
-            <a:r>
-              <a:rPr lang="zh-CN" altLang="en-US" dirty="0" smtClean="0"/>
-              <a:t>直接</a:t>
+              <a:t>：注解只保留在源代码中，编译器直接丢弃这种注解。</a:t>
+            </a:r>
+            <a:endParaRPr lang="en-US" altLang="zh-CN" dirty="0"/>
+          </a:p>
+          <a:p>
+            <a:endParaRPr lang="en-US" altLang="zh-CN" dirty="0"/>
+          </a:p>
+          <a:p>
+            <a:r>
+              <a:rPr lang="en-US" altLang="zh-CN" dirty="0"/>
+              <a:t>	2. @Target</a:t>
             </a:r>
             <a:r>
               <a:rPr lang="zh-CN" altLang="en-US" dirty="0"/>
-              <a:t>丢弃这种注解</a:t>
-            </a:r>
-            <a:r>
-              <a:rPr lang="zh-CN" altLang="en-US" dirty="0" smtClean="0"/>
-              <a:t>。</a:t>
-            </a:r>
-            <a:endParaRPr lang="en-US" altLang="zh-CN" dirty="0" smtClean="0"/>
-          </a:p>
-          <a:p>
+              <a:t>也只能修饰注解定义，它用于指定被修饰的注解能用于修饰哪些程序单元。</a:t>
+            </a:r>
             <a:endParaRPr lang="en-US" altLang="zh-CN" dirty="0"/>
           </a:p>
           <a:p>
             <a:r>
-              <a:rPr lang="en-US" altLang="zh-CN" dirty="0" smtClean="0"/>
-              <a:t>	2. </a:t>
-            </a:r>
-            <a:r>
               <a:rPr lang="en-US" altLang="zh-CN" dirty="0"/>
-              <a:t>@Target</a:t>
-            </a:r>
-            <a:r>
-              <a:rPr lang="zh-CN" altLang="en-US" dirty="0"/>
-              <a:t>也只能修饰注解定义，它用于指定被修饰的注解能用于</a:t>
-            </a:r>
-            <a:r>
-              <a:rPr lang="zh-CN" altLang="en-US" dirty="0" smtClean="0"/>
-              <a:t>修饰</a:t>
-            </a:r>
-            <a:r>
-              <a:rPr lang="zh-CN" altLang="en-US" dirty="0"/>
-              <a:t>哪些程序单元</a:t>
-            </a:r>
-            <a:r>
-              <a:rPr lang="zh-CN" altLang="en-US" dirty="0" smtClean="0"/>
-              <a:t>。</a:t>
-            </a:r>
-            <a:endParaRPr lang="en-US" altLang="zh-CN" dirty="0" smtClean="0"/>
-          </a:p>
-          <a:p>
-            <a:r>
-              <a:rPr lang="en-US" altLang="zh-CN" dirty="0"/>
-              <a:t>	</a:t>
-            </a:r>
-            <a:r>
-              <a:rPr lang="en-US" altLang="zh-CN" dirty="0" smtClean="0"/>
-              <a:t>	</a:t>
-            </a:r>
-            <a:r>
-              <a:rPr lang="en-US" altLang="zh-CN" dirty="0"/>
-              <a:t>➢ </a:t>
+              <a:t>		➢ </a:t>
             </a:r>
             <a:r>
               <a:rPr lang="en-US" altLang="zh-CN" dirty="0" err="1"/>
@@ -4112,20 +4033,12 @@
             </a:r>
             <a:r>
               <a:rPr lang="zh-CN" altLang="en-US" dirty="0"/>
-              <a:t>：指定该策略的注解只能</a:t>
-            </a:r>
-            <a:r>
-              <a:rPr lang="zh-CN" altLang="en-US" dirty="0" smtClean="0"/>
-              <a:t>修饰注解</a:t>
-            </a:r>
-            <a:r>
-              <a:rPr lang="zh-CN" altLang="en-US" dirty="0"/>
-              <a:t>。</a:t>
-            </a:r>
-          </a:p>
-          <a:p>
-            <a:r>
-              <a:rPr lang="en-US" altLang="zh-CN" dirty="0" smtClean="0"/>
+              <a:t>：指定该策略的注解只能修饰注解。</a:t>
+            </a:r>
+          </a:p>
+          <a:p>
+            <a:r>
+              <a:rPr lang="en-US" altLang="zh-CN" dirty="0"/>
               <a:t>		➢ </a:t>
             </a:r>
             <a:r>
@@ -4134,20 +4047,12 @@
             </a:r>
             <a:r>
               <a:rPr lang="zh-CN" altLang="en-US" dirty="0"/>
-              <a:t>：指定该策略的注解只能修饰</a:t>
-            </a:r>
-            <a:r>
-              <a:rPr lang="zh-CN" altLang="en-US" dirty="0" smtClean="0"/>
-              <a:t>构造器</a:t>
-            </a:r>
-            <a:r>
-              <a:rPr lang="zh-CN" altLang="en-US" dirty="0"/>
-              <a:t>。</a:t>
-            </a:r>
-          </a:p>
-          <a:p>
-            <a:r>
-              <a:rPr lang="en-US" altLang="zh-CN" dirty="0" smtClean="0"/>
+              <a:t>：指定该策略的注解只能修饰构造器。</a:t>
+            </a:r>
+          </a:p>
+          <a:p>
+            <a:r>
+              <a:rPr lang="en-US" altLang="zh-CN" dirty="0"/>
               <a:t>		➢ </a:t>
             </a:r>
             <a:r>
@@ -4161,7 +4066,7 @@
           </a:p>
           <a:p>
             <a:r>
-              <a:rPr lang="en-US" altLang="zh-CN" dirty="0" smtClean="0"/>
+              <a:rPr lang="en-US" altLang="zh-CN" dirty="0"/>
               <a:t>		➢ </a:t>
             </a:r>
             <a:r>
@@ -4170,20 +4075,12 @@
             </a:r>
             <a:r>
               <a:rPr lang="zh-CN" altLang="en-US" dirty="0"/>
-              <a:t>：指定该策略的注解只能修饰</a:t>
-            </a:r>
-            <a:r>
-              <a:rPr lang="zh-CN" altLang="en-US" dirty="0" smtClean="0"/>
-              <a:t>局部变量</a:t>
-            </a:r>
-            <a:r>
-              <a:rPr lang="zh-CN" altLang="en-US" dirty="0"/>
-              <a:t>。</a:t>
-            </a:r>
-          </a:p>
-          <a:p>
-            <a:r>
-              <a:rPr lang="en-US" altLang="zh-CN" dirty="0" smtClean="0"/>
+              <a:t>：指定该策略的注解只能修饰局部变量。</a:t>
+            </a:r>
+          </a:p>
+          <a:p>
+            <a:r>
+              <a:rPr lang="en-US" altLang="zh-CN" dirty="0"/>
               <a:t>		➢ </a:t>
             </a:r>
             <a:r>
@@ -4197,7 +4094,7 @@
           </a:p>
           <a:p>
             <a:r>
-              <a:rPr lang="en-US" altLang="zh-CN" dirty="0" smtClean="0"/>
+              <a:rPr lang="en-US" altLang="zh-CN" dirty="0"/>
               <a:t>		➢ </a:t>
             </a:r>
             <a:r>
@@ -4211,7 +4108,7 @@
           </a:p>
           <a:p>
             <a:r>
-              <a:rPr lang="en-US" altLang="zh-CN" dirty="0" smtClean="0"/>
+              <a:rPr lang="en-US" altLang="zh-CN" dirty="0"/>
               <a:t>		➢ </a:t>
             </a:r>
             <a:r>
@@ -4225,7 +4122,7 @@
           </a:p>
           <a:p>
             <a:r>
-              <a:rPr lang="en-US" altLang="zh-CN" dirty="0" smtClean="0"/>
+              <a:rPr lang="en-US" altLang="zh-CN" dirty="0"/>
               <a:t>		➢ </a:t>
             </a:r>
             <a:r>
@@ -4234,15 +4131,68 @@
             </a:r>
             <a:r>
               <a:rPr lang="zh-CN" altLang="en-US" dirty="0"/>
-              <a:t>：指定该策略的注解可以修饰类、接口（</a:t>
-            </a:r>
-            <a:r>
-              <a:rPr lang="zh-CN" altLang="en-US" dirty="0" smtClean="0"/>
-              <a:t>包括</a:t>
-            </a:r>
-            <a:r>
-              <a:rPr lang="zh-CN" altLang="en-US" dirty="0"/>
-              <a:t>注解类型）或枚举定义。</a:t>
+              <a:t>：指定该策略的注解可以修饰类、接口（包括注解类型）或枚举定义。</a:t>
+            </a:r>
+            <a:endParaRPr lang="en-US" altLang="zh-CN" dirty="0"/>
+          </a:p>
+          <a:p>
+            <a:endParaRPr lang="en-US" altLang="zh-CN" dirty="0"/>
+          </a:p>
+          <a:p>
+            <a:r>
+              <a:rPr lang="en-US" altLang="zh-CN" dirty="0"/>
+              <a:t>	3. </a:t>
+            </a:r>
+            <a:r>
+              <a:rPr lang="en-US" altLang="zh-TW" dirty="0"/>
+              <a:t>@Inherited</a:t>
+            </a:r>
+            <a:r>
+              <a:rPr lang="zh-TW" altLang="en-US" dirty="0"/>
+              <a:t>元注解指定被它修饰的注解将具有继承性</a:t>
+            </a:r>
+            <a:r>
+              <a:rPr lang="en-US" altLang="zh-TW" dirty="0"/>
+              <a:t>——</a:t>
+            </a:r>
+            <a:r>
+              <a:rPr lang="zh-TW" altLang="en-US" dirty="0"/>
+              <a:t>如果某个类使用了</a:t>
+            </a:r>
+            <a:r>
+              <a:rPr lang="en-US" altLang="zh-TW" dirty="0"/>
+              <a:t>@Xxx</a:t>
+            </a:r>
+            <a:r>
+              <a:rPr lang="zh-TW" altLang="en-US" dirty="0"/>
+              <a:t>注解（定义该注解</a:t>
+            </a:r>
+            <a:endParaRPr lang="en-US" altLang="zh-TW" dirty="0"/>
+          </a:p>
+          <a:p>
+            <a:r>
+              <a:rPr lang="en-US" altLang="zh-TW" dirty="0"/>
+              <a:t>                       </a:t>
+            </a:r>
+            <a:r>
+              <a:rPr lang="zh-TW" altLang="en-US" dirty="0"/>
+              <a:t>时使用了</a:t>
+            </a:r>
+            <a:r>
+              <a:rPr lang="en-US" altLang="zh-TW" dirty="0"/>
+              <a:t>@Inherited</a:t>
+            </a:r>
+            <a:r>
+              <a:rPr lang="zh-TW" altLang="en-US" dirty="0"/>
+              <a:t>修饰）修饰，则其子类将自动被</a:t>
+            </a:r>
+            <a:r>
+              <a:rPr lang="en-US" altLang="zh-TW" dirty="0"/>
+              <a:t>@Xxx</a:t>
+            </a:r>
+            <a:r>
+              <a:rPr lang="zh-TW" altLang="en-US" dirty="0"/>
+              <a:t>修饰。</a:t>
             </a:r>
             <a:endParaRPr lang="en-US" altLang="zh-CN" dirty="0"/>
           </a:p>
@@ -4252,6 +4202,230 @@
     <p:extLst>
       <p:ext uri="{BB962C8B-B14F-4D97-AF65-F5344CB8AC3E}">
         <p14:creationId xmlns:p14="http://schemas.microsoft.com/office/powerpoint/2010/main" val="3986853482"/>
+      </p:ext>
+    </p:extLst>
+  </p:cSld>
+  <p:clrMapOvr>
+    <a:masterClrMapping/>
+  </p:clrMapOvr>
+</p:sld>
+</file>
+
+<file path=ppt/slides/slide5.xml><?xml version="1.0" encoding="utf-8"?>
+<p:sld xmlns:a="http://schemas.openxmlformats.org/drawingml/2006/main" xmlns:r="http://schemas.openxmlformats.org/officeDocument/2006/relationships" xmlns:p="http://schemas.openxmlformats.org/presentationml/2006/main">
+  <p:cSld>
+    <p:spTree>
+      <p:nvGrpSpPr>
+        <p:cNvPr id="1" name=""/>
+        <p:cNvGrpSpPr/>
+        <p:nvPr/>
+      </p:nvGrpSpPr>
+      <p:grpSpPr>
+        <a:xfrm>
+          <a:off x="0" y="0"/>
+          <a:ext cx="0" cy="0"/>
+          <a:chOff x="0" y="0"/>
+          <a:chExt cx="0" cy="0"/>
+        </a:xfrm>
+      </p:grpSpPr>
+      <p:sp>
+        <p:nvSpPr>
+          <p:cNvPr id="4" name="文字方塊 3">
+            <a:extLst>
+              <a:ext uri="{FF2B5EF4-FFF2-40B4-BE49-F238E27FC236}">
+                <a16:creationId xmlns:a16="http://schemas.microsoft.com/office/drawing/2014/main" id="{7E1B4E4A-329E-4CC3-8F94-13241A7BFCE9}"/>
+              </a:ext>
+            </a:extLst>
+          </p:cNvPr>
+          <p:cNvSpPr txBox="1"/>
+          <p:nvPr/>
+        </p:nvSpPr>
+        <p:spPr>
+          <a:xfrm>
+            <a:off x="121920" y="162560"/>
+            <a:ext cx="2031325" cy="369332"/>
+          </a:xfrm>
+          <a:prstGeom prst="rect">
+            <a:avLst/>
+          </a:prstGeom>
+          <a:noFill/>
+        </p:spPr>
+        <p:txBody>
+          <a:bodyPr wrap="none" rtlCol="0">
+            <a:spAutoFit/>
+          </a:bodyPr>
+          <a:lstStyle/>
+          <a:p>
+            <a:r>
+              <a:rPr lang="zh-CN" altLang="en-US" b="1" u="sng" dirty="0"/>
+              <a:t>自定义注解的使用</a:t>
+            </a:r>
+            <a:endParaRPr lang="zh-TW" altLang="en-US" b="1" u="sng" dirty="0"/>
+          </a:p>
+        </p:txBody>
+      </p:sp>
+      <p:sp>
+        <p:nvSpPr>
+          <p:cNvPr id="5" name="文字方塊 4">
+            <a:extLst>
+              <a:ext uri="{FF2B5EF4-FFF2-40B4-BE49-F238E27FC236}">
+                <a16:creationId xmlns:a16="http://schemas.microsoft.com/office/drawing/2014/main" id="{30DB9B0B-C718-4299-B80A-3C657765509A}"/>
+              </a:ext>
+            </a:extLst>
+          </p:cNvPr>
+          <p:cNvSpPr txBox="1"/>
+          <p:nvPr/>
+        </p:nvSpPr>
+        <p:spPr>
+          <a:xfrm>
+            <a:off x="680720" y="741680"/>
+            <a:ext cx="10688320" cy="3139321"/>
+          </a:xfrm>
+          <a:prstGeom prst="rect">
+            <a:avLst/>
+          </a:prstGeom>
+          <a:noFill/>
+        </p:spPr>
+        <p:txBody>
+          <a:bodyPr wrap="square" rtlCol="0">
+            <a:spAutoFit/>
+          </a:bodyPr>
+          <a:lstStyle/>
+          <a:p>
+            <a:r>
+              <a:rPr lang="en-US" altLang="zh-CN" dirty="0"/>
+              <a:t>1. </a:t>
+            </a:r>
+            <a:r>
+              <a:rPr lang="zh-CN" altLang="en-US" dirty="0"/>
+              <a:t>自定义注解定义方式</a:t>
+            </a:r>
+            <a:endParaRPr lang="en-US" altLang="zh-CN" dirty="0"/>
+          </a:p>
+          <a:p>
+            <a:r>
+              <a:rPr lang="zh-TW" altLang="en-US" dirty="0"/>
+              <a:t>定义新的注解类型使用</a:t>
+            </a:r>
+            <a:r>
+              <a:rPr lang="en-US" altLang="zh-TW" dirty="0"/>
+              <a:t>@interface</a:t>
+            </a:r>
+            <a:r>
+              <a:rPr lang="zh-TW" altLang="en-US" dirty="0"/>
+              <a:t>关键字（在原有的</a:t>
+            </a:r>
+            <a:r>
+              <a:rPr lang="en-US" altLang="zh-TW" dirty="0"/>
+              <a:t>interface</a:t>
+            </a:r>
+            <a:r>
+              <a:rPr lang="zh-TW" altLang="en-US" dirty="0"/>
+              <a:t>关键字前增加</a:t>
+            </a:r>
+            <a:r>
+              <a:rPr lang="en-US" altLang="zh-TW" dirty="0"/>
+              <a:t>@</a:t>
+            </a:r>
+            <a:r>
+              <a:rPr lang="zh-TW" altLang="en-US" dirty="0"/>
+              <a:t>符号）定义一个新的注解类型与定义一个接口非常像</a:t>
+            </a:r>
+            <a:r>
+              <a:rPr lang="en-US" altLang="zh-CN" dirty="0"/>
+              <a:t>.</a:t>
+            </a:r>
+          </a:p>
+          <a:p>
+            <a:endParaRPr lang="en-US" altLang="zh-TW" dirty="0"/>
+          </a:p>
+          <a:p>
+            <a:r>
+              <a:rPr lang="en-US" altLang="zh-CN" dirty="0"/>
+              <a:t>2. </a:t>
+            </a:r>
+            <a:r>
+              <a:rPr lang="zh-CN" altLang="en-US" dirty="0"/>
+              <a:t>根据注解是否可以包含成员变量，可以把注解分为如下两类。</a:t>
+            </a:r>
+          </a:p>
+          <a:p>
+            <a:r>
+              <a:rPr lang="en-US" altLang="zh-CN" dirty="0"/>
+              <a:t>	</a:t>
+            </a:r>
+            <a:r>
+              <a:rPr lang="zh-CN" altLang="en-US" dirty="0"/>
+              <a:t>➢ 标记注解：没有定义成员变量的注解类型被称为标记。这种注</a:t>
+            </a:r>
+          </a:p>
+          <a:p>
+            <a:r>
+              <a:rPr lang="en-US" altLang="zh-CN" dirty="0"/>
+              <a:t>		          </a:t>
+            </a:r>
+            <a:r>
+              <a:rPr lang="zh-CN" altLang="en-US" dirty="0"/>
+              <a:t>解仅利用自身的存在与否来提供信息， 如前面介绍的</a:t>
+            </a:r>
+            <a:r>
+              <a:rPr lang="en-US" altLang="zh-TW" dirty="0"/>
+              <a:t>@Override</a:t>
+            </a:r>
+            <a:r>
+              <a:rPr lang="zh-TW" altLang="en-US" dirty="0"/>
+              <a:t>、</a:t>
+            </a:r>
+            <a:r>
+              <a:rPr lang="en-US" altLang="zh-TW" dirty="0"/>
+              <a:t>@Test</a:t>
+            </a:r>
+            <a:r>
+              <a:rPr lang="zh-TW" altLang="en-US" dirty="0"/>
+              <a:t>等注解。</a:t>
+            </a:r>
+          </a:p>
+          <a:p>
+            <a:r>
+              <a:rPr lang="en-US" altLang="zh-CN" dirty="0"/>
+              <a:t>	</a:t>
+            </a:r>
+            <a:r>
+              <a:rPr lang="zh-CN" altLang="en-US" dirty="0"/>
+              <a:t>➢ 元数据注解：包含成员变量的注解，因为它们可以接受更多的</a:t>
+            </a:r>
+          </a:p>
+          <a:p>
+            <a:r>
+              <a:rPr lang="en-US" altLang="zh-CN" dirty="0"/>
+              <a:t>		          </a:t>
+            </a:r>
+            <a:r>
+              <a:rPr lang="zh-CN" altLang="en-US" dirty="0"/>
+              <a:t>元数据，所以也被称为元数据注解。</a:t>
+            </a:r>
+            <a:endParaRPr lang="en-US" altLang="zh-CN" dirty="0"/>
+          </a:p>
+          <a:p>
+            <a:endParaRPr lang="en-US" altLang="zh-TW" dirty="0"/>
+          </a:p>
+          <a:p>
+            <a:r>
+              <a:rPr lang="en-US" altLang="zh-CN" dirty="0"/>
+              <a:t>3. </a:t>
+            </a:r>
+            <a:r>
+              <a:rPr lang="zh-CN" altLang="en-US" dirty="0"/>
+              <a:t>提取注解信息</a:t>
+            </a:r>
+            <a:endParaRPr lang="zh-TW" altLang="en-US" dirty="0"/>
+          </a:p>
+        </p:txBody>
+      </p:sp>
+    </p:spTree>
+    <p:extLst>
+      <p:ext uri="{BB962C8B-B14F-4D97-AF65-F5344CB8AC3E}">
+        <p14:creationId xmlns:p14="http://schemas.microsoft.com/office/powerpoint/2010/main" val="3783105079"/>
       </p:ext>
     </p:extLst>
   </p:cSld>

</xml_diff>